<commit_message>
Update diagramme de classes
</commit_message>
<xml_diff>
--- a/TP Chat - Tableau de Classes.pptx
+++ b/TP Chat - Tableau de Classes.pptx
@@ -3155,8 +3155,8 @@
         </p:nvSpPr>
         <p:spPr>
           <a:xfrm>
-            <a:off x="553724" y="609092"/>
-            <a:ext cx="2120331" cy="498629"/>
+            <a:off x="553724" y="609093"/>
+            <a:ext cx="2120331" cy="646796"/>
           </a:xfrm>
           <a:prstGeom prst="rect">
             <a:avLst/>
@@ -3182,104 +3182,11 @@
           <a:bodyPr rtlCol="0" anchor="ctr"/>
           <a:lstStyle/>
           <a:p>
-            <a:r>
-              <a:rPr lang="en-US" sz="900" dirty="0" smtClean="0">
-                <a:solidFill>
-                  <a:srgbClr val="000000"/>
-                </a:solidFill>
-              </a:rPr>
-              <a:t># </a:t>
-            </a:r>
-            <a:r>
-              <a:rPr lang="en-US" sz="900" dirty="0" err="1" smtClean="0">
-                <a:solidFill>
-                  <a:srgbClr val="000000"/>
-                </a:solidFill>
-              </a:rPr>
-              <a:t>listeUsers</a:t>
-            </a:r>
-            <a:r>
-              <a:rPr lang="en-US" sz="900" dirty="0" smtClean="0">
-                <a:solidFill>
-                  <a:srgbClr val="000000"/>
-                </a:solidFill>
-              </a:rPr>
-              <a:t> : </a:t>
-            </a:r>
-            <a:r>
-              <a:rPr lang="en-US" sz="900" dirty="0" err="1" smtClean="0">
-                <a:solidFill>
-                  <a:srgbClr val="000000"/>
-                </a:solidFill>
-              </a:rPr>
-              <a:t>liste</a:t>
-            </a:r>
-            <a:r>
-              <a:rPr lang="en-US" sz="900" dirty="0" smtClean="0">
-                <a:solidFill>
-                  <a:srgbClr val="000000"/>
-                </a:solidFill>
-              </a:rPr>
-              <a:t>&lt;String&gt;</a:t>
-            </a:r>
-          </a:p>
-          <a:p>
-            <a:r>
-              <a:rPr lang="en-US" sz="900" dirty="0" smtClean="0">
-                <a:solidFill>
-                  <a:srgbClr val="000000"/>
-                </a:solidFill>
-              </a:rPr>
-              <a:t># </a:t>
-            </a:r>
-            <a:r>
-              <a:rPr lang="en-US" sz="900" dirty="0" err="1" smtClean="0">
-                <a:solidFill>
-                  <a:srgbClr val="000000"/>
-                </a:solidFill>
-              </a:rPr>
-              <a:t>listeMessages</a:t>
-            </a:r>
-            <a:r>
-              <a:rPr lang="en-US" sz="900" dirty="0" smtClean="0">
-                <a:solidFill>
-                  <a:srgbClr val="000000"/>
-                </a:solidFill>
-              </a:rPr>
-              <a:t> : </a:t>
-            </a:r>
-            <a:r>
-              <a:rPr lang="en-US" sz="900" dirty="0" err="1" smtClean="0">
-                <a:solidFill>
-                  <a:srgbClr val="000000"/>
-                </a:solidFill>
-              </a:rPr>
-              <a:t>liste</a:t>
-            </a:r>
-            <a:r>
-              <a:rPr lang="en-US" sz="900" dirty="0" smtClean="0">
-                <a:solidFill>
-                  <a:srgbClr val="000000"/>
-                </a:solidFill>
-              </a:rPr>
-              <a:t>&lt;String, String, </a:t>
-            </a:r>
-            <a:r>
-              <a:rPr lang="en-US" sz="900" dirty="0" err="1" smtClean="0">
-                <a:solidFill>
-                  <a:srgbClr val="000000"/>
-                </a:solidFill>
-              </a:rPr>
-              <a:t>int</a:t>
-            </a:r>
-            <a:r>
-              <a:rPr lang="en-US" sz="900" dirty="0" smtClean="0">
-                <a:solidFill>
-                  <a:srgbClr val="000000"/>
-                </a:solidFill>
-              </a:rPr>
-              <a:t>&gt;</a:t>
-            </a:r>
+            <a:endParaRPr lang="en-US" sz="900" dirty="0">
+              <a:solidFill>
+                <a:srgbClr val="000000"/>
+              </a:solidFill>
+            </a:endParaRPr>
           </a:p>
         </p:txBody>
       </p:sp>
@@ -3291,7 +3198,7 @@
         </p:nvSpPr>
         <p:spPr>
           <a:xfrm>
-            <a:off x="553724" y="1107721"/>
+            <a:off x="553724" y="1255889"/>
             <a:ext cx="2120331" cy="825501"/>
           </a:xfrm>
           <a:prstGeom prst="rect">
@@ -3664,6 +3571,284 @@
               </a:rPr>
               <a:t>+ refresh()</a:t>
             </a:r>
+            <a:endParaRPr lang="en-US" sz="900" dirty="0">
+              <a:solidFill>
+                <a:srgbClr val="000000"/>
+              </a:solidFill>
+            </a:endParaRPr>
+          </a:p>
+        </p:txBody>
+      </p:sp>
+      <p:sp>
+        <p:nvSpPr>
+          <p:cNvPr id="54" name="Rectangle 53"/>
+          <p:cNvSpPr/>
+          <p:nvPr/>
+        </p:nvSpPr>
+        <p:spPr>
+          <a:xfrm>
+            <a:off x="4791293" y="293596"/>
+            <a:ext cx="2010263" cy="319773"/>
+          </a:xfrm>
+          <a:prstGeom prst="rect">
+            <a:avLst/>
+          </a:prstGeom>
+          <a:noFill/>
+          <a:ln w="9525" cmpd="sng"/>
+        </p:spPr>
+        <p:style>
+          <a:lnRef idx="2">
+            <a:schemeClr val="dk1"/>
+          </a:lnRef>
+          <a:fillRef idx="1">
+            <a:schemeClr val="lt1"/>
+          </a:fillRef>
+          <a:effectRef idx="0">
+            <a:schemeClr val="dk1"/>
+          </a:effectRef>
+          <a:fontRef idx="minor">
+            <a:schemeClr val="dk1"/>
+          </a:fontRef>
+        </p:style>
+        <p:txBody>
+          <a:bodyPr rtlCol="0" anchor="ctr"/>
+          <a:lstStyle/>
+          <a:p>
+            <a:pPr algn="ctr"/>
+            <a:r>
+              <a:rPr lang="en-US" dirty="0" err="1" smtClean="0">
+                <a:solidFill>
+                  <a:srgbClr val="000000"/>
+                </a:solidFill>
+              </a:rPr>
+              <a:t>Messagerie</a:t>
+            </a:r>
+            <a:endParaRPr lang="en-US" dirty="0">
+              <a:solidFill>
+                <a:srgbClr val="000000"/>
+              </a:solidFill>
+            </a:endParaRPr>
+          </a:p>
+        </p:txBody>
+      </p:sp>
+      <p:sp>
+        <p:nvSpPr>
+          <p:cNvPr id="55" name="Rectangle 54"/>
+          <p:cNvSpPr/>
+          <p:nvPr/>
+        </p:nvSpPr>
+        <p:spPr>
+          <a:xfrm>
+            <a:off x="4791292" y="613369"/>
+            <a:ext cx="2010264" cy="579020"/>
+          </a:xfrm>
+          <a:prstGeom prst="rect">
+            <a:avLst/>
+          </a:prstGeom>
+          <a:noFill/>
+          <a:ln w="9525" cmpd="sng"/>
+        </p:spPr>
+        <p:style>
+          <a:lnRef idx="2">
+            <a:schemeClr val="dk1"/>
+          </a:lnRef>
+          <a:fillRef idx="1">
+            <a:schemeClr val="lt1"/>
+          </a:fillRef>
+          <a:effectRef idx="0">
+            <a:schemeClr val="dk1"/>
+          </a:effectRef>
+          <a:fontRef idx="minor">
+            <a:schemeClr val="dk1"/>
+          </a:fontRef>
+        </p:style>
+        <p:txBody>
+          <a:bodyPr rtlCol="0" anchor="ctr"/>
+          <a:lstStyle/>
+          <a:p>
+            <a:r>
+              <a:rPr lang="en-US" sz="900" dirty="0">
+                <a:solidFill>
+                  <a:srgbClr val="000000"/>
+                </a:solidFill>
+              </a:rPr>
+              <a:t># </a:t>
+            </a:r>
+            <a:r>
+              <a:rPr lang="en-US" sz="900" dirty="0" err="1">
+                <a:solidFill>
+                  <a:srgbClr val="000000"/>
+                </a:solidFill>
+              </a:rPr>
+              <a:t>listeUsers</a:t>
+            </a:r>
+            <a:r>
+              <a:rPr lang="en-US" sz="900" dirty="0">
+                <a:solidFill>
+                  <a:srgbClr val="000000"/>
+                </a:solidFill>
+              </a:rPr>
+              <a:t> : </a:t>
+            </a:r>
+            <a:r>
+              <a:rPr lang="en-US" sz="900" dirty="0" err="1">
+                <a:solidFill>
+                  <a:srgbClr val="000000"/>
+                </a:solidFill>
+              </a:rPr>
+              <a:t>liste</a:t>
+            </a:r>
+            <a:r>
+              <a:rPr lang="en-US" sz="900" dirty="0">
+                <a:solidFill>
+                  <a:srgbClr val="000000"/>
+                </a:solidFill>
+              </a:rPr>
+              <a:t>&lt;String&gt;</a:t>
+            </a:r>
+          </a:p>
+          <a:p>
+            <a:r>
+              <a:rPr lang="en-US" sz="900" dirty="0">
+                <a:solidFill>
+                  <a:srgbClr val="000000"/>
+                </a:solidFill>
+              </a:rPr>
+              <a:t># </a:t>
+            </a:r>
+            <a:r>
+              <a:rPr lang="en-US" sz="900" dirty="0" err="1">
+                <a:solidFill>
+                  <a:srgbClr val="000000"/>
+                </a:solidFill>
+              </a:rPr>
+              <a:t>tableauId</a:t>
+            </a:r>
+            <a:r>
+              <a:rPr lang="en-US" sz="900" dirty="0">
+                <a:solidFill>
+                  <a:srgbClr val="000000"/>
+                </a:solidFill>
+              </a:rPr>
+              <a:t> : </a:t>
+            </a:r>
+            <a:r>
+              <a:rPr lang="en-US" sz="900" dirty="0" err="1">
+                <a:solidFill>
+                  <a:srgbClr val="000000"/>
+                </a:solidFill>
+              </a:rPr>
+              <a:t>HashMap</a:t>
+            </a:r>
+            <a:r>
+              <a:rPr lang="en-US" sz="900" dirty="0">
+                <a:solidFill>
+                  <a:srgbClr val="000000"/>
+                </a:solidFill>
+              </a:rPr>
+              <a:t>&lt;Integer, String&gt;</a:t>
+            </a:r>
+          </a:p>
+          <a:p>
+            <a:r>
+              <a:rPr lang="en-US" sz="900" dirty="0">
+                <a:solidFill>
+                  <a:srgbClr val="000000"/>
+                </a:solidFill>
+              </a:rPr>
+              <a:t># </a:t>
+            </a:r>
+            <a:r>
+              <a:rPr lang="en-US" sz="900" dirty="0" err="1">
+                <a:solidFill>
+                  <a:srgbClr val="000000"/>
+                </a:solidFill>
+              </a:rPr>
+              <a:t>tableauMessages</a:t>
+            </a:r>
+            <a:r>
+              <a:rPr lang="en-US" sz="900" dirty="0">
+                <a:solidFill>
+                  <a:srgbClr val="000000"/>
+                </a:solidFill>
+              </a:rPr>
+              <a:t> : </a:t>
+            </a:r>
+            <a:r>
+              <a:rPr lang="en-US" sz="900" dirty="0" err="1">
+                <a:solidFill>
+                  <a:srgbClr val="000000"/>
+                </a:solidFill>
+              </a:rPr>
+              <a:t>HashMap</a:t>
+            </a:r>
+            <a:r>
+              <a:rPr lang="en-US" sz="900" dirty="0">
+                <a:solidFill>
+                  <a:srgbClr val="000000"/>
+                </a:solidFill>
+              </a:rPr>
+              <a:t>&lt;Integer, String, </a:t>
+            </a:r>
+            <a:r>
+              <a:rPr lang="en-US" sz="900" dirty="0" err="1">
+                <a:solidFill>
+                  <a:srgbClr val="000000"/>
+                </a:solidFill>
+              </a:rPr>
+              <a:t>int</a:t>
+            </a:r>
+            <a:r>
+              <a:rPr lang="en-US" sz="900" dirty="0">
+                <a:solidFill>
+                  <a:srgbClr val="000000"/>
+                </a:solidFill>
+              </a:rPr>
+              <a:t>&gt;</a:t>
+            </a:r>
+            <a:endParaRPr lang="en-US" sz="900" dirty="0">
+              <a:solidFill>
+                <a:srgbClr val="000000"/>
+              </a:solidFill>
+            </a:endParaRPr>
+          </a:p>
+        </p:txBody>
+      </p:sp>
+      <p:sp>
+        <p:nvSpPr>
+          <p:cNvPr id="56" name="Rectangle 55"/>
+          <p:cNvSpPr/>
+          <p:nvPr/>
+        </p:nvSpPr>
+        <p:spPr>
+          <a:xfrm>
+            <a:off x="4791292" y="1192389"/>
+            <a:ext cx="2010264" cy="599369"/>
+          </a:xfrm>
+          <a:prstGeom prst="rect">
+            <a:avLst/>
+          </a:prstGeom>
+          <a:noFill/>
+          <a:ln w="9525" cmpd="sng"/>
+        </p:spPr>
+        <p:style>
+          <a:lnRef idx="2">
+            <a:schemeClr val="dk1"/>
+          </a:lnRef>
+          <a:fillRef idx="1">
+            <a:schemeClr val="lt1"/>
+          </a:fillRef>
+          <a:effectRef idx="0">
+            <a:schemeClr val="dk1"/>
+          </a:effectRef>
+          <a:fontRef idx="minor">
+            <a:schemeClr val="dk1"/>
+          </a:fontRef>
+        </p:style>
+        <p:txBody>
+          <a:bodyPr rtlCol="0" anchor="ctr"/>
+          <a:lstStyle/>
+          <a:p>
             <a:endParaRPr lang="en-US" sz="900" dirty="0">
               <a:solidFill>
                 <a:srgbClr val="000000"/>

</xml_diff>

<commit_message>
Update diagrammes classes bis
</commit_message>
<xml_diff>
--- a/TP Chat - Tableau de Classes.pptx
+++ b/TP Chat - Tableau de Classes.pptx
@@ -3823,7 +3823,7 @@
         <p:spPr>
           <a:xfrm>
             <a:off x="4791292" y="1192389"/>
-            <a:ext cx="2010264" cy="599369"/>
+            <a:ext cx="2010264" cy="754944"/>
           </a:xfrm>
           <a:prstGeom prst="rect">
             <a:avLst/>
@@ -3849,6 +3849,118 @@
           <a:bodyPr rtlCol="0" anchor="ctr"/>
           <a:lstStyle/>
           <a:p>
+            <a:r>
+              <a:rPr lang="en-US" sz="900" dirty="0">
+                <a:solidFill>
+                  <a:srgbClr val="000000"/>
+                </a:solidFill>
+              </a:rPr>
+              <a:t>+ connect(String id)</a:t>
+            </a:r>
+          </a:p>
+          <a:p>
+            <a:r>
+              <a:rPr lang="en-US" sz="900" dirty="0">
+                <a:solidFill>
+                  <a:srgbClr val="000000"/>
+                </a:solidFill>
+              </a:rPr>
+              <a:t>+ send(String message, String id)</a:t>
+            </a:r>
+          </a:p>
+          <a:p>
+            <a:r>
+              <a:rPr lang="en-US" sz="900" dirty="0">
+                <a:solidFill>
+                  <a:srgbClr val="000000"/>
+                </a:solidFill>
+              </a:rPr>
+              <a:t>+ bye (String id)</a:t>
+            </a:r>
+          </a:p>
+          <a:p>
+            <a:r>
+              <a:rPr lang="en-US" sz="900" dirty="0">
+                <a:solidFill>
+                  <a:srgbClr val="000000"/>
+                </a:solidFill>
+              </a:rPr>
+              <a:t>+ who() : </a:t>
+            </a:r>
+            <a:r>
+              <a:rPr lang="en-US" sz="900" dirty="0" err="1">
+                <a:solidFill>
+                  <a:srgbClr val="000000"/>
+                </a:solidFill>
+              </a:rPr>
+              <a:t>Liste</a:t>
+            </a:r>
+            <a:r>
+              <a:rPr lang="en-US" sz="900" dirty="0">
+                <a:solidFill>
+                  <a:srgbClr val="000000"/>
+                </a:solidFill>
+              </a:rPr>
+              <a:t>&lt;String&gt;</a:t>
+            </a:r>
+          </a:p>
+          <a:p>
+            <a:r>
+              <a:rPr lang="en-US" sz="900" dirty="0">
+                <a:solidFill>
+                  <a:srgbClr val="000000"/>
+                </a:solidFill>
+              </a:rPr>
+              <a:t>+ </a:t>
+            </a:r>
+            <a:r>
+              <a:rPr lang="en-US" sz="900" dirty="0" err="1">
+                <a:solidFill>
+                  <a:srgbClr val="000000"/>
+                </a:solidFill>
+              </a:rPr>
+              <a:t>getMessages</a:t>
+            </a:r>
+            <a:r>
+              <a:rPr lang="en-US" sz="900" dirty="0">
+                <a:solidFill>
+                  <a:srgbClr val="000000"/>
+                </a:solidFill>
+              </a:rPr>
+              <a:t>(</a:t>
+            </a:r>
+            <a:r>
+              <a:rPr lang="en-US" sz="900" dirty="0" err="1">
+                <a:solidFill>
+                  <a:srgbClr val="000000"/>
+                </a:solidFill>
+              </a:rPr>
+              <a:t>int</a:t>
+            </a:r>
+            <a:r>
+              <a:rPr lang="en-US" sz="900" dirty="0">
+                <a:solidFill>
+                  <a:srgbClr val="000000"/>
+                </a:solidFill>
+              </a:rPr>
+              <a:t> </a:t>
+            </a:r>
+            <a:r>
+              <a:rPr lang="en-US" sz="900" dirty="0" err="1">
+                <a:solidFill>
+                  <a:srgbClr val="000000"/>
+                </a:solidFill>
+              </a:rPr>
+              <a:t>nbMessage</a:t>
+            </a:r>
+            <a:r>
+              <a:rPr lang="en-US" sz="900" dirty="0">
+                <a:solidFill>
+                  <a:srgbClr val="000000"/>
+                </a:solidFill>
+              </a:rPr>
+              <a:t>)</a:t>
+            </a:r>
             <a:endParaRPr lang="en-US" sz="900" dirty="0">
               <a:solidFill>
                 <a:srgbClr val="000000"/>

</xml_diff>